<commit_message>
finished intro to df
</commit_message>
<xml_diff>
--- a/materials/draft.pptx
+++ b/materials/draft.pptx
@@ -3390,10 +3390,9 @@
           </a:p>
           <a:p>
             <a:r>
-              <a:rPr lang="en-US"/>
+              <a:rPr lang="en-US" dirty="0"/>
               <a:t>01/24/2018</a:t>
             </a:r>
-            <a:endParaRPr lang="en-US" dirty="0"/>
           </a:p>
         </p:txBody>
       </p:sp>
@@ -4679,9 +4678,10 @@
               <a:buChar char="§"/>
             </a:pPr>
             <a:r>
-              <a:rPr lang="en-US" sz="1400" b="1" dirty="0"/>
+              <a:rPr lang="en-US" sz="1400" b="1" dirty="0" err="1"/>
               <a:t>PyTorch</a:t>
             </a:r>
+            <a:endParaRPr lang="en-US" sz="1400" b="1" dirty="0"/>
           </a:p>
         </p:txBody>
       </p:sp>
@@ -4823,9 +4823,10 @@
             <a:lstStyle/>
             <a:p>
               <a:r>
-                <a:rPr lang="en-US" sz="1400" b="1" dirty="0"/>
+                <a:rPr lang="en-US" sz="1400" b="1" dirty="0" err="1"/>
                 <a:t>IPython</a:t>
               </a:r>
+              <a:endParaRPr lang="en-US" sz="1400" b="1" dirty="0"/>
             </a:p>
             <a:p>
               <a:pPr marL="285750" indent="-285750">
@@ -5991,10 +5992,10 @@
       </p:grpSpPr>
       <p:sp>
         <p:nvSpPr>
-          <p:cNvPr id="12" name="Rectangle 11">
-            <a:extLst>
-              <a:ext uri="{FF2B5EF4-FFF2-40B4-BE49-F238E27FC236}">
-                <a16:creationId xmlns:a16="http://schemas.microsoft.com/office/drawing/2014/main" id="{BFDC535F-AC0A-417D-96AB-6706BECACD95}"/>
+          <p:cNvPr id="23" name="Rectangle 22">
+            <a:extLst>
+              <a:ext uri="{FF2B5EF4-FFF2-40B4-BE49-F238E27FC236}">
+                <a16:creationId xmlns:a16="http://schemas.microsoft.com/office/drawing/2014/main" id="{0959F59E-86AC-4677-BFB0-9CD55AB10761}"/>
               </a:ext>
               <a:ext uri="{C183D7F6-B498-43B3-948B-1728B52AA6E4}">
                 <adec:decorative xmlns:adec="http://schemas.microsoft.com/office/drawing/2017/decorative" val="1"/>
@@ -6014,14 +6015,17 @@
         </p:nvSpPr>
         <p:spPr>
           <a:xfrm>
-            <a:off x="1" y="0"/>
-            <a:ext cx="12188726" cy="6858000"/>
+            <a:off x="0" y="0"/>
+            <a:ext cx="12192000" cy="6858000"/>
           </a:xfrm>
           <a:prstGeom prst="rect">
             <a:avLst/>
           </a:prstGeom>
           <a:solidFill>
-            <a:srgbClr val="323555"/>
+            <a:schemeClr val="bg1">
+              <a:lumMod val="85000"/>
+              <a:alpha val="90000"/>
+            </a:schemeClr>
           </a:solidFill>
           <a:ln>
             <a:noFill/>
@@ -6054,10 +6058,10 @@
       </p:sp>
       <p:sp>
         <p:nvSpPr>
-          <p:cNvPr id="14" name="Rectangle 13">
-            <a:extLst>
-              <a:ext uri="{FF2B5EF4-FFF2-40B4-BE49-F238E27FC236}">
-                <a16:creationId xmlns:a16="http://schemas.microsoft.com/office/drawing/2014/main" id="{97AAAF8E-31DB-4148-8FCA-4D8233D691C6}"/>
+          <p:cNvPr id="25" name="Rectangle 24">
+            <a:extLst>
+              <a:ext uri="{FF2B5EF4-FFF2-40B4-BE49-F238E27FC236}">
+                <a16:creationId xmlns:a16="http://schemas.microsoft.com/office/drawing/2014/main" id="{997ED08E-7CE7-4539-8E16-6A356378B3D3}"/>
               </a:ext>
               <a:ext uri="{C183D7F6-B498-43B3-948B-1728B52AA6E4}">
                 <adec:decorative xmlns:adec="http://schemas.microsoft.com/office/drawing/2017/decorative" val="1"/>
@@ -6077,8 +6081,8 @@
         </p:nvSpPr>
         <p:spPr>
           <a:xfrm>
-            <a:off x="495953" y="484068"/>
-            <a:ext cx="6898027" cy="5889300"/>
+            <a:off x="477012" y="487090"/>
+            <a:ext cx="7324526" cy="5897880"/>
           </a:xfrm>
           <a:prstGeom prst="rect">
             <a:avLst/>
@@ -6086,8 +6090,14 @@
           <a:solidFill>
             <a:srgbClr val="FFFFFF"/>
           </a:solidFill>
-          <a:ln>
-            <a:noFill/>
+          <a:ln w="19050">
+            <a:solidFill>
+              <a:schemeClr val="tx1">
+                <a:lumMod val="50000"/>
+                <a:lumOff val="50000"/>
+                <a:alpha val="80000"/>
+              </a:schemeClr>
+            </a:solidFill>
           </a:ln>
         </p:spPr>
         <p:style>
@@ -6143,8 +6153,8 @@
         </p:blipFill>
         <p:spPr>
           <a:xfrm>
-            <a:off x="832842" y="806754"/>
-            <a:ext cx="6224248" cy="5243929"/>
+            <a:off x="834654" y="650497"/>
+            <a:ext cx="6612541" cy="5571066"/>
           </a:xfrm>
           <a:prstGeom prst="rect">
             <a:avLst/>
@@ -6153,10 +6163,10 @@
       </p:pic>
       <p:sp>
         <p:nvSpPr>
-          <p:cNvPr id="16" name="Rectangle 15">
-            <a:extLst>
-              <a:ext uri="{FF2B5EF4-FFF2-40B4-BE49-F238E27FC236}">
-                <a16:creationId xmlns:a16="http://schemas.microsoft.com/office/drawing/2014/main" id="{AA274328-4774-4DF9-BA53-452565122FBB}"/>
+          <p:cNvPr id="27" name="Rectangle 26">
+            <a:extLst>
+              <a:ext uri="{FF2B5EF4-FFF2-40B4-BE49-F238E27FC236}">
+                <a16:creationId xmlns:a16="http://schemas.microsoft.com/office/drawing/2014/main" id="{39F96DC1-4B54-4B36-B945-425E4C04AFBD}"/>
               </a:ext>
               <a:ext uri="{C183D7F6-B498-43B3-948B-1728B52AA6E4}">
                 <adec:decorative xmlns:adec="http://schemas.microsoft.com/office/drawing/2017/decorative" val="1"/>
@@ -6176,8 +6186,8 @@
         </p:nvSpPr>
         <p:spPr>
           <a:xfrm>
-            <a:off x="7561393" y="484069"/>
-            <a:ext cx="4145975" cy="3499898"/>
+            <a:off x="7969003" y="487090"/>
+            <a:ext cx="3745983" cy="1856232"/>
           </a:xfrm>
           <a:prstGeom prst="rect">
             <a:avLst/>
@@ -6185,8 +6195,14 @@
           <a:solidFill>
             <a:srgbClr val="FFFFFF"/>
           </a:solidFill>
-          <a:ln>
-            <a:noFill/>
+          <a:ln w="19050">
+            <a:solidFill>
+              <a:schemeClr val="tx1">
+                <a:lumMod val="50000"/>
+                <a:lumOff val="50000"/>
+                <a:alpha val="80000"/>
+              </a:schemeClr>
+            </a:solidFill>
           </a:ln>
         </p:spPr>
         <p:style>
@@ -6242,8 +6258,8 @@
         </p:blipFill>
         <p:spPr>
           <a:xfrm>
-            <a:off x="7883059" y="1527344"/>
-            <a:ext cx="3502643" cy="1413347"/>
+            <a:off x="8129872" y="719343"/>
+            <a:ext cx="3420946" cy="1380381"/>
           </a:xfrm>
           <a:prstGeom prst="rect">
             <a:avLst/>
@@ -6252,10 +6268,10 @@
       </p:pic>
       <p:sp>
         <p:nvSpPr>
-          <p:cNvPr id="18" name="Rectangle 17">
-            <a:extLst>
-              <a:ext uri="{FF2B5EF4-FFF2-40B4-BE49-F238E27FC236}">
-                <a16:creationId xmlns:a16="http://schemas.microsoft.com/office/drawing/2014/main" id="{01C7B46D-2FEF-4FAA-915B-8B21A66BB647}"/>
+          <p:cNvPr id="29" name="Rectangle 28">
+            <a:extLst>
+              <a:ext uri="{FF2B5EF4-FFF2-40B4-BE49-F238E27FC236}">
+                <a16:creationId xmlns:a16="http://schemas.microsoft.com/office/drawing/2014/main" id="{A4F450A1-0760-4C39-82E4-515AA4FC9473}"/>
               </a:ext>
               <a:ext uri="{C183D7F6-B498-43B3-948B-1728B52AA6E4}">
                 <adec:decorative xmlns:adec="http://schemas.microsoft.com/office/drawing/2017/decorative" val="1"/>
@@ -6275,8 +6291,8 @@
         </p:nvSpPr>
         <p:spPr>
           <a:xfrm>
-            <a:off x="7561393" y="4144834"/>
-            <a:ext cx="4145975" cy="2211517"/>
+            <a:off x="7969003" y="2511639"/>
+            <a:ext cx="3745983" cy="1856232"/>
           </a:xfrm>
           <a:prstGeom prst="rect">
             <a:avLst/>
@@ -6284,8 +6300,14 @@
           <a:solidFill>
             <a:srgbClr val="FFFFFF"/>
           </a:solidFill>
-          <a:ln>
-            <a:noFill/>
+          <a:ln w="19050">
+            <a:solidFill>
+              <a:schemeClr val="tx1">
+                <a:lumMod val="50000"/>
+                <a:lumOff val="50000"/>
+                <a:alpha val="80000"/>
+              </a:schemeClr>
+            </a:solidFill>
           </a:ln>
         </p:spPr>
         <p:style>
@@ -6315,10 +6337,10 @@
       </p:sp>
       <p:pic>
         <p:nvPicPr>
-          <p:cNvPr id="7" name="Picture 6" descr="A screenshot of a cell phone&#10;&#10;Description automatically generated">
-            <a:extLst>
-              <a:ext uri="{FF2B5EF4-FFF2-40B4-BE49-F238E27FC236}">
-                <a16:creationId xmlns:a16="http://schemas.microsoft.com/office/drawing/2014/main" id="{5996B32F-EEEB-C646-BEFC-8489E3634DB6}"/>
+          <p:cNvPr id="2" name="Picture 1">
+            <a:extLst>
+              <a:ext uri="{FF2B5EF4-FFF2-40B4-BE49-F238E27FC236}">
+                <a16:creationId xmlns:a16="http://schemas.microsoft.com/office/drawing/2014/main" id="{8B8675B4-8518-A34E-8339-92017719A907}"/>
               </a:ext>
             </a:extLst>
           </p:cNvPr>
@@ -6335,8 +6357,107 @@
         </p:blipFill>
         <p:spPr>
           <a:xfrm>
-            <a:off x="7883059" y="4642008"/>
-            <a:ext cx="3502643" cy="1217168"/>
+            <a:off x="8129872" y="2814250"/>
+            <a:ext cx="3420946" cy="1248645"/>
+          </a:xfrm>
+          <a:prstGeom prst="rect">
+            <a:avLst/>
+          </a:prstGeom>
+        </p:spPr>
+      </p:pic>
+      <p:sp>
+        <p:nvSpPr>
+          <p:cNvPr id="31" name="Rectangle 30">
+            <a:extLst>
+              <a:ext uri="{FF2B5EF4-FFF2-40B4-BE49-F238E27FC236}">
+                <a16:creationId xmlns:a16="http://schemas.microsoft.com/office/drawing/2014/main" id="{0185CD32-2E94-4663-81AE-CC54E44AC2FC}"/>
+              </a:ext>
+              <a:ext uri="{C183D7F6-B498-43B3-948B-1728B52AA6E4}">
+                <adec:decorative xmlns:adec="http://schemas.microsoft.com/office/drawing/2017/decorative" val="1"/>
+              </a:ext>
+            </a:extLst>
+          </p:cNvPr>
+          <p:cNvSpPr>
+            <a:spLocks noGrp="1" noRot="1" noChangeAspect="1" noMove="1" noResize="1" noEditPoints="1" noAdjustHandles="1" noChangeArrowheads="1" noChangeShapeType="1" noTextEdit="1"/>
+          </p:cNvSpPr>
+          <p:nvPr>
+            <p:extLst>
+              <p:ext uri="{386F3935-93C4-4BCD-93E2-E3B085C9AB24}">
+                <p16:designElem xmlns:p16="http://schemas.microsoft.com/office/powerpoint/2015/main" val="1"/>
+              </p:ext>
+            </p:extLst>
+          </p:nvPr>
+        </p:nvSpPr>
+        <p:spPr>
+          <a:xfrm>
+            <a:off x="7969003" y="4528738"/>
+            <a:ext cx="3745983" cy="1856232"/>
+          </a:xfrm>
+          <a:prstGeom prst="rect">
+            <a:avLst/>
+          </a:prstGeom>
+          <a:solidFill>
+            <a:srgbClr val="FFFFFF"/>
+          </a:solidFill>
+          <a:ln w="19050">
+            <a:solidFill>
+              <a:schemeClr val="tx1">
+                <a:lumMod val="50000"/>
+                <a:lumOff val="50000"/>
+                <a:alpha val="80000"/>
+              </a:schemeClr>
+            </a:solidFill>
+          </a:ln>
+        </p:spPr>
+        <p:style>
+          <a:lnRef idx="2">
+            <a:schemeClr val="accent1">
+              <a:shade val="50000"/>
+            </a:schemeClr>
+          </a:lnRef>
+          <a:fillRef idx="1">
+            <a:schemeClr val="accent1"/>
+          </a:fillRef>
+          <a:effectRef idx="0">
+            <a:schemeClr val="accent1"/>
+          </a:effectRef>
+          <a:fontRef idx="minor">
+            <a:schemeClr val="lt1"/>
+          </a:fontRef>
+        </p:style>
+        <p:txBody>
+          <a:bodyPr rtlCol="0" anchor="ctr"/>
+          <a:lstStyle/>
+          <a:p>
+            <a:pPr algn="ctr"/>
+            <a:endParaRPr lang="en-US"/>
+          </a:p>
+        </p:txBody>
+      </p:sp>
+      <p:pic>
+        <p:nvPicPr>
+          <p:cNvPr id="7" name="Picture 6" descr="A screenshot of a cell phone&#10;&#10;Description automatically generated">
+            <a:extLst>
+              <a:ext uri="{FF2B5EF4-FFF2-40B4-BE49-F238E27FC236}">
+                <a16:creationId xmlns:a16="http://schemas.microsoft.com/office/drawing/2014/main" id="{5996B32F-EEEB-C646-BEFC-8489E3634DB6}"/>
+              </a:ext>
+            </a:extLst>
+          </p:cNvPr>
+          <p:cNvPicPr>
+            <a:picLocks noChangeAspect="1"/>
+          </p:cNvPicPr>
+          <p:nvPr/>
+        </p:nvPicPr>
+        <p:blipFill>
+          <a:blip r:embed="rId5"/>
+          <a:stretch>
+            <a:fillRect/>
+          </a:stretch>
+        </p:blipFill>
+        <p:spPr>
+          <a:xfrm>
+            <a:off x="8129872" y="4861107"/>
+            <a:ext cx="3420946" cy="1188778"/>
           </a:xfrm>
           <a:prstGeom prst="rect">
             <a:avLst/>
@@ -6637,7 +6758,7 @@
         </p:blipFill>
         <p:spPr bwMode="auto">
           <a:xfrm>
-            <a:off x="2127556" y="2295247"/>
+            <a:off x="3165048" y="2295247"/>
             <a:ext cx="702035" cy="702035"/>
           </a:xfrm>
           <a:prstGeom prst="rect">
@@ -6684,7 +6805,7 @@
         </p:blipFill>
         <p:spPr bwMode="auto">
           <a:xfrm>
-            <a:off x="2175898" y="3013783"/>
+            <a:off x="3213390" y="3013783"/>
             <a:ext cx="690778" cy="588731"/>
           </a:xfrm>
           <a:prstGeom prst="rect">
@@ -6731,7 +6852,7 @@
         </p:blipFill>
         <p:spPr bwMode="auto">
           <a:xfrm>
-            <a:off x="2164641" y="3678129"/>
+            <a:off x="3202133" y="3678129"/>
             <a:ext cx="702035" cy="491425"/>
           </a:xfrm>
           <a:prstGeom prst="rect">
@@ -6778,7 +6899,7 @@
         </p:blipFill>
         <p:spPr bwMode="auto">
           <a:xfrm>
-            <a:off x="3494540" y="1871071"/>
+            <a:off x="4532032" y="1871071"/>
             <a:ext cx="556206" cy="192355"/>
           </a:xfrm>
           <a:prstGeom prst="rect">
@@ -6825,7 +6946,7 @@
         </p:blipFill>
         <p:spPr bwMode="auto">
           <a:xfrm>
-            <a:off x="3494540" y="3905464"/>
+            <a:off x="4532032" y="3905464"/>
             <a:ext cx="1147826" cy="264090"/>
           </a:xfrm>
           <a:prstGeom prst="rect">
@@ -6872,7 +6993,7 @@
         </p:blipFill>
         <p:spPr bwMode="auto">
           <a:xfrm>
-            <a:off x="3494540" y="2488863"/>
+            <a:off x="4532032" y="2488863"/>
             <a:ext cx="804558" cy="314805"/>
           </a:xfrm>
           <a:prstGeom prst="rect">
@@ -6919,7 +7040,7 @@
         </p:blipFill>
         <p:spPr bwMode="auto">
           <a:xfrm>
-            <a:off x="3494540" y="3384625"/>
+            <a:off x="4532032" y="3384625"/>
             <a:ext cx="623349" cy="219211"/>
           </a:xfrm>
           <a:prstGeom prst="rect">
@@ -6991,7 +7112,7 @@
         </p:nvCxnSpPr>
         <p:spPr>
           <a:xfrm>
-            <a:off x="3159370" y="1011115"/>
+            <a:off x="4196862" y="1011115"/>
             <a:ext cx="0" cy="3947747"/>
           </a:xfrm>
           <a:prstGeom prst="line">
@@ -7031,7 +7152,7 @@
         </p:nvSpPr>
         <p:spPr>
           <a:xfrm>
-            <a:off x="752634" y="4589530"/>
+            <a:off x="551006" y="4588448"/>
             <a:ext cx="1025794" cy="369332"/>
           </a:xfrm>
           <a:prstGeom prst="rect">
@@ -7066,7 +7187,7 @@
         </p:nvSpPr>
         <p:spPr>
           <a:xfrm>
-            <a:off x="1826419" y="4597781"/>
+            <a:off x="2227831" y="4588989"/>
             <a:ext cx="1380378" cy="369332"/>
           </a:xfrm>
           <a:prstGeom prst="rect">
@@ -7101,7 +7222,7 @@
         </p:nvSpPr>
         <p:spPr>
           <a:xfrm>
-            <a:off x="3206797" y="4597781"/>
+            <a:off x="4196862" y="4588448"/>
             <a:ext cx="1938800" cy="369332"/>
           </a:xfrm>
           <a:prstGeom prst="rect">
@@ -7118,6 +7239,351 @@
             <a:r>
               <a:rPr lang="en-US" u="sng" dirty="0"/>
               <a:t>Web Development</a:t>
+            </a:r>
+          </a:p>
+        </p:txBody>
+      </p:sp>
+      <p:sp>
+        <p:nvSpPr>
+          <p:cNvPr id="22" name="TextBox 21">
+            <a:extLst>
+              <a:ext uri="{FF2B5EF4-FFF2-40B4-BE49-F238E27FC236}">
+                <a16:creationId xmlns:a16="http://schemas.microsoft.com/office/drawing/2014/main" id="{97B34C5D-E487-7547-818B-937F014F7737}"/>
+              </a:ext>
+            </a:extLst>
+          </p:cNvPr>
+          <p:cNvSpPr txBox="1"/>
+          <p:nvPr/>
+        </p:nvSpPr>
+        <p:spPr>
+          <a:xfrm>
+            <a:off x="340774" y="1135413"/>
+            <a:ext cx="631070" cy="276999"/>
+          </a:xfrm>
+          <a:prstGeom prst="rect">
+            <a:avLst/>
+          </a:prstGeom>
+          <a:noFill/>
+        </p:spPr>
+        <p:txBody>
+          <a:bodyPr wrap="none" rtlCol="0">
+            <a:spAutoFit/>
+          </a:bodyPr>
+          <a:lstStyle/>
+          <a:p>
+            <a:r>
+              <a:rPr lang="en-US" sz="1200" b="1" dirty="0"/>
+              <a:t>numpy</a:t>
+            </a:r>
+          </a:p>
+        </p:txBody>
+      </p:sp>
+      <p:sp>
+        <p:nvSpPr>
+          <p:cNvPr id="23" name="TextBox 22">
+            <a:extLst>
+              <a:ext uri="{FF2B5EF4-FFF2-40B4-BE49-F238E27FC236}">
+                <a16:creationId xmlns:a16="http://schemas.microsoft.com/office/drawing/2014/main" id="{9750BC5D-42C1-8C4B-8385-585F4B81A01D}"/>
+              </a:ext>
+            </a:extLst>
+          </p:cNvPr>
+          <p:cNvSpPr txBox="1"/>
+          <p:nvPr/>
+        </p:nvSpPr>
+        <p:spPr>
+          <a:xfrm>
+            <a:off x="340774" y="1786427"/>
+            <a:ext cx="502830" cy="276999"/>
+          </a:xfrm>
+          <a:prstGeom prst="rect">
+            <a:avLst/>
+          </a:prstGeom>
+          <a:noFill/>
+        </p:spPr>
+        <p:txBody>
+          <a:bodyPr wrap="none" rtlCol="0">
+            <a:spAutoFit/>
+          </a:bodyPr>
+          <a:lstStyle/>
+          <a:p>
+            <a:r>
+              <a:rPr lang="en-US" sz="1200" b="1" dirty="0"/>
+              <a:t>scipy</a:t>
+            </a:r>
+          </a:p>
+        </p:txBody>
+      </p:sp>
+      <p:sp>
+        <p:nvSpPr>
+          <p:cNvPr id="24" name="TextBox 23">
+            <a:extLst>
+              <a:ext uri="{FF2B5EF4-FFF2-40B4-BE49-F238E27FC236}">
+                <a16:creationId xmlns:a16="http://schemas.microsoft.com/office/drawing/2014/main" id="{EE59F2C7-9242-7945-8482-573EB76493A1}"/>
+              </a:ext>
+            </a:extLst>
+          </p:cNvPr>
+          <p:cNvSpPr txBox="1"/>
+          <p:nvPr/>
+        </p:nvSpPr>
+        <p:spPr>
+          <a:xfrm>
+            <a:off x="228852" y="2438266"/>
+            <a:ext cx="854914" cy="276999"/>
+          </a:xfrm>
+          <a:prstGeom prst="rect">
+            <a:avLst/>
+          </a:prstGeom>
+          <a:noFill/>
+        </p:spPr>
+        <p:txBody>
+          <a:bodyPr wrap="none" rtlCol="0">
+            <a:spAutoFit/>
+          </a:bodyPr>
+          <a:lstStyle/>
+          <a:p>
+            <a:r>
+              <a:rPr lang="en-US" sz="1200" b="1" dirty="0"/>
+              <a:t>matplotlib</a:t>
+            </a:r>
+          </a:p>
+        </p:txBody>
+      </p:sp>
+      <p:sp>
+        <p:nvSpPr>
+          <p:cNvPr id="25" name="TextBox 24">
+            <a:extLst>
+              <a:ext uri="{FF2B5EF4-FFF2-40B4-BE49-F238E27FC236}">
+                <a16:creationId xmlns:a16="http://schemas.microsoft.com/office/drawing/2014/main" id="{5BEE7F4E-F6EC-CD47-85AD-67F39B9D0070}"/>
+              </a:ext>
+            </a:extLst>
+          </p:cNvPr>
+          <p:cNvSpPr txBox="1"/>
+          <p:nvPr/>
+        </p:nvSpPr>
+        <p:spPr>
+          <a:xfrm>
+            <a:off x="251422" y="3110360"/>
+            <a:ext cx="681533" cy="276999"/>
+          </a:xfrm>
+          <a:prstGeom prst="rect">
+            <a:avLst/>
+          </a:prstGeom>
+          <a:noFill/>
+        </p:spPr>
+        <p:txBody>
+          <a:bodyPr wrap="none" rtlCol="0">
+            <a:spAutoFit/>
+          </a:bodyPr>
+          <a:lstStyle/>
+          <a:p>
+            <a:r>
+              <a:rPr lang="en-US" sz="1200" b="1" dirty="0"/>
+              <a:t>ipython</a:t>
+            </a:r>
+          </a:p>
+        </p:txBody>
+      </p:sp>
+      <p:sp>
+        <p:nvSpPr>
+          <p:cNvPr id="26" name="TextBox 25">
+            <a:extLst>
+              <a:ext uri="{FF2B5EF4-FFF2-40B4-BE49-F238E27FC236}">
+                <a16:creationId xmlns:a16="http://schemas.microsoft.com/office/drawing/2014/main" id="{C25CB691-EAED-EF4F-9D00-154D865441BC}"/>
+              </a:ext>
+            </a:extLst>
+          </p:cNvPr>
+          <p:cNvSpPr txBox="1"/>
+          <p:nvPr/>
+        </p:nvSpPr>
+        <p:spPr>
+          <a:xfrm>
+            <a:off x="252392" y="3827441"/>
+            <a:ext cx="646331" cy="276999"/>
+          </a:xfrm>
+          <a:prstGeom prst="rect">
+            <a:avLst/>
+          </a:prstGeom>
+          <a:noFill/>
+        </p:spPr>
+        <p:txBody>
+          <a:bodyPr wrap="none" rtlCol="0">
+            <a:spAutoFit/>
+          </a:bodyPr>
+          <a:lstStyle/>
+          <a:p>
+            <a:r>
+              <a:rPr lang="en-US" sz="1200" b="1" dirty="0"/>
+              <a:t>pandas</a:t>
+            </a:r>
+          </a:p>
+        </p:txBody>
+      </p:sp>
+      <p:sp>
+        <p:nvSpPr>
+          <p:cNvPr id="27" name="TextBox 26">
+            <a:extLst>
+              <a:ext uri="{FF2B5EF4-FFF2-40B4-BE49-F238E27FC236}">
+                <a16:creationId xmlns:a16="http://schemas.microsoft.com/office/drawing/2014/main" id="{6CF3957F-12E5-EE4B-B935-AE37CBDEB1A8}"/>
+              </a:ext>
+            </a:extLst>
+          </p:cNvPr>
+          <p:cNvSpPr txBox="1"/>
+          <p:nvPr/>
+        </p:nvSpPr>
+        <p:spPr>
+          <a:xfrm>
+            <a:off x="2000313" y="2438265"/>
+            <a:ext cx="934871" cy="276999"/>
+          </a:xfrm>
+          <a:prstGeom prst="rect">
+            <a:avLst/>
+          </a:prstGeom>
+          <a:noFill/>
+        </p:spPr>
+        <p:txBody>
+          <a:bodyPr wrap="none" rtlCol="0">
+            <a:spAutoFit/>
+          </a:bodyPr>
+          <a:lstStyle/>
+          <a:p>
+            <a:r>
+              <a:rPr lang="en-US" sz="1200" b="1" dirty="0"/>
+              <a:t>Sci-kit learn</a:t>
+            </a:r>
+          </a:p>
+        </p:txBody>
+      </p:sp>
+      <p:sp>
+        <p:nvSpPr>
+          <p:cNvPr id="28" name="TextBox 27">
+            <a:extLst>
+              <a:ext uri="{FF2B5EF4-FFF2-40B4-BE49-F238E27FC236}">
+                <a16:creationId xmlns:a16="http://schemas.microsoft.com/office/drawing/2014/main" id="{75BC2B85-312B-7145-8E2B-BCC51C887963}"/>
+              </a:ext>
+            </a:extLst>
+          </p:cNvPr>
+          <p:cNvSpPr txBox="1"/>
+          <p:nvPr/>
+        </p:nvSpPr>
+        <p:spPr>
+          <a:xfrm>
+            <a:off x="2003154" y="3107626"/>
+            <a:ext cx="914866" cy="276999"/>
+          </a:xfrm>
+          <a:prstGeom prst="rect">
+            <a:avLst/>
+          </a:prstGeom>
+          <a:noFill/>
+        </p:spPr>
+        <p:txBody>
+          <a:bodyPr wrap="none" rtlCol="0">
+            <a:spAutoFit/>
+          </a:bodyPr>
+          <a:lstStyle/>
+          <a:p>
+            <a:r>
+              <a:rPr lang="en-US" sz="1200" b="1" dirty="0"/>
+              <a:t>TensorFlow</a:t>
+            </a:r>
+          </a:p>
+        </p:txBody>
+      </p:sp>
+      <p:sp>
+        <p:nvSpPr>
+          <p:cNvPr id="29" name="TextBox 28">
+            <a:extLst>
+              <a:ext uri="{FF2B5EF4-FFF2-40B4-BE49-F238E27FC236}">
+                <a16:creationId xmlns:a16="http://schemas.microsoft.com/office/drawing/2014/main" id="{485B8F0A-8848-E94D-B47A-8D040316C9DC}"/>
+              </a:ext>
+            </a:extLst>
+          </p:cNvPr>
+          <p:cNvSpPr txBox="1"/>
+          <p:nvPr/>
+        </p:nvSpPr>
+        <p:spPr>
+          <a:xfrm>
+            <a:off x="2132203" y="3826694"/>
+            <a:ext cx="674672" cy="276999"/>
+          </a:xfrm>
+          <a:prstGeom prst="rect">
+            <a:avLst/>
+          </a:prstGeom>
+          <a:noFill/>
+        </p:spPr>
+        <p:txBody>
+          <a:bodyPr wrap="none" rtlCol="0">
+            <a:spAutoFit/>
+          </a:bodyPr>
+          <a:lstStyle/>
+          <a:p>
+            <a:r>
+              <a:rPr lang="en-US" sz="1200" b="1" dirty="0"/>
+              <a:t>pytorch</a:t>
+            </a:r>
+          </a:p>
+        </p:txBody>
+      </p:sp>
+      <p:pic>
+        <p:nvPicPr>
+          <p:cNvPr id="31" name="Picture 30">
+            <a:extLst>
+              <a:ext uri="{FF2B5EF4-FFF2-40B4-BE49-F238E27FC236}">
+                <a16:creationId xmlns:a16="http://schemas.microsoft.com/office/drawing/2014/main" id="{0B5164D6-A94A-9E4E-87B7-F451A56A087D}"/>
+              </a:ext>
+            </a:extLst>
+          </p:cNvPr>
+          <p:cNvPicPr>
+            <a:picLocks noChangeAspect="1"/>
+          </p:cNvPicPr>
+          <p:nvPr/>
+        </p:nvPicPr>
+        <p:blipFill>
+          <a:blip r:embed="rId14"/>
+          <a:stretch>
+            <a:fillRect/>
+          </a:stretch>
+        </p:blipFill>
+        <p:spPr>
+          <a:xfrm>
+            <a:off x="3224976" y="1742819"/>
+            <a:ext cx="695618" cy="450760"/>
+          </a:xfrm>
+          <a:prstGeom prst="rect">
+            <a:avLst/>
+          </a:prstGeom>
+        </p:spPr>
+      </p:pic>
+      <p:sp>
+        <p:nvSpPr>
+          <p:cNvPr id="32" name="TextBox 31">
+            <a:extLst>
+              <a:ext uri="{FF2B5EF4-FFF2-40B4-BE49-F238E27FC236}">
+                <a16:creationId xmlns:a16="http://schemas.microsoft.com/office/drawing/2014/main" id="{3544C85F-F5B3-0A43-AA8B-2D9AD735B3E1}"/>
+              </a:ext>
+            </a:extLst>
+          </p:cNvPr>
+          <p:cNvSpPr txBox="1"/>
+          <p:nvPr/>
+        </p:nvSpPr>
+        <p:spPr>
+          <a:xfrm>
+            <a:off x="2046264" y="1768904"/>
+            <a:ext cx="951094" cy="276999"/>
+          </a:xfrm>
+          <a:prstGeom prst="rect">
+            <a:avLst/>
+          </a:prstGeom>
+          <a:noFill/>
+        </p:spPr>
+        <p:txBody>
+          <a:bodyPr wrap="none" rtlCol="0">
+            <a:spAutoFit/>
+          </a:bodyPr>
+          <a:lstStyle/>
+          <a:p>
+            <a:r>
+              <a:rPr lang="en-US" sz="1200" b="1" dirty="0"/>
+              <a:t>statsmodels</a:t>
             </a:r>
           </a:p>
         </p:txBody>

</xml_diff>

<commit_message>
finished web scraping session
</commit_message>
<xml_diff>
--- a/materials/draft.pptx
+++ b/materials/draft.pptx
@@ -5990,12 +5990,42 @@
           <a:chExt cx="0" cy="0"/>
         </a:xfrm>
       </p:grpSpPr>
-      <p:sp>
-        <p:nvSpPr>
-          <p:cNvPr id="23" name="Rectangle 22">
-            <a:extLst>
-              <a:ext uri="{FF2B5EF4-FFF2-40B4-BE49-F238E27FC236}">
-                <a16:creationId xmlns:a16="http://schemas.microsoft.com/office/drawing/2014/main" id="{0959F59E-86AC-4677-BFB0-9CD55AB10761}"/>
+      <p:pic>
+        <p:nvPicPr>
+          <p:cNvPr id="2" name="Picture 1" descr="A screenshot of a cell phone&#10;&#10;Description automatically generated">
+            <a:extLst>
+              <a:ext uri="{FF2B5EF4-FFF2-40B4-BE49-F238E27FC236}">
+                <a16:creationId xmlns:a16="http://schemas.microsoft.com/office/drawing/2014/main" id="{8B8675B4-8518-A34E-8339-92017719A907}"/>
+              </a:ext>
+            </a:extLst>
+          </p:cNvPr>
+          <p:cNvPicPr>
+            <a:picLocks noChangeAspect="1"/>
+          </p:cNvPicPr>
+          <p:nvPr/>
+        </p:nvPicPr>
+        <p:blipFill>
+          <a:blip r:embed="rId2"/>
+          <a:stretch>
+            <a:fillRect/>
+          </a:stretch>
+        </p:blipFill>
+        <p:spPr>
+          <a:xfrm>
+            <a:off x="457202" y="783935"/>
+            <a:ext cx="5426764" cy="1980768"/>
+          </a:xfrm>
+          <a:prstGeom prst="rect">
+            <a:avLst/>
+          </a:prstGeom>
+        </p:spPr>
+      </p:pic>
+      <p:sp>
+        <p:nvSpPr>
+          <p:cNvPr id="36" name="Rectangle 35">
+            <a:extLst>
+              <a:ext uri="{FF2B5EF4-FFF2-40B4-BE49-F238E27FC236}">
+                <a16:creationId xmlns:a16="http://schemas.microsoft.com/office/drawing/2014/main" id="{417CDA24-35F8-4540-8C52-3096D6D94949}"/>
               </a:ext>
               <a:ext uri="{C183D7F6-B498-43B3-948B-1728B52AA6E4}">
                 <adec:decorative xmlns:adec="http://schemas.microsoft.com/office/drawing/2017/decorative" val="1"/>
@@ -6015,16 +6045,16 @@
         </p:nvSpPr>
         <p:spPr>
           <a:xfrm>
-            <a:off x="0" y="0"/>
-            <a:ext cx="12192000" cy="6858000"/>
+            <a:off x="6050280" y="0"/>
+            <a:ext cx="91440" cy="6858000"/>
           </a:xfrm>
           <a:prstGeom prst="rect">
             <a:avLst/>
           </a:prstGeom>
           <a:solidFill>
-            <a:schemeClr val="bg1">
-              <a:lumMod val="85000"/>
-              <a:alpha val="90000"/>
+            <a:schemeClr val="tx1">
+              <a:lumMod val="75000"/>
+              <a:lumOff val="25000"/>
             </a:schemeClr>
           </a:solidFill>
           <a:ln>
@@ -6056,12 +6086,48 @@
           </a:p>
         </p:txBody>
       </p:sp>
-      <p:sp>
-        <p:nvSpPr>
-          <p:cNvPr id="25" name="Rectangle 24">
-            <a:extLst>
-              <a:ext uri="{FF2B5EF4-FFF2-40B4-BE49-F238E27FC236}">
-                <a16:creationId xmlns:a16="http://schemas.microsoft.com/office/drawing/2014/main" id="{997ED08E-7CE7-4539-8E16-6A356378B3D3}"/>
+      <p:pic>
+        <p:nvPicPr>
+          <p:cNvPr id="3" name="Picture 2" descr="A screenshot of a cell phone&#10;&#10;Description automatically generated">
+            <a:extLst>
+              <a:ext uri="{FF2B5EF4-FFF2-40B4-BE49-F238E27FC236}">
+                <a16:creationId xmlns:a16="http://schemas.microsoft.com/office/drawing/2014/main" id="{4E66AAD6-17C7-B04D-99FF-08D9BAB6828C}"/>
+              </a:ext>
+            </a:extLst>
+          </p:cNvPr>
+          <p:cNvPicPr>
+            <a:picLocks noChangeAspect="1"/>
+          </p:cNvPicPr>
+          <p:nvPr/>
+        </p:nvPicPr>
+        <p:blipFill>
+          <a:blip r:embed="rId3">
+            <a:extLst>
+              <a:ext uri="{28A0092B-C50C-407E-A947-70E740481C1C}">
+                <a14:useLocalDpi xmlns:a14="http://schemas.microsoft.com/office/drawing/2010/main" val="0"/>
+              </a:ext>
+            </a:extLst>
+          </a:blip>
+          <a:stretch>
+            <a:fillRect/>
+          </a:stretch>
+        </p:blipFill>
+        <p:spPr>
+          <a:xfrm>
+            <a:off x="7140195" y="321734"/>
+            <a:ext cx="3448273" cy="2905170"/>
+          </a:xfrm>
+          <a:prstGeom prst="rect">
+            <a:avLst/>
+          </a:prstGeom>
+        </p:spPr>
+      </p:pic>
+      <p:sp>
+        <p:nvSpPr>
+          <p:cNvPr id="38" name="Rectangle 37">
+            <a:extLst>
+              <a:ext uri="{FF2B5EF4-FFF2-40B4-BE49-F238E27FC236}">
+                <a16:creationId xmlns:a16="http://schemas.microsoft.com/office/drawing/2014/main" id="{8658BFE0-4E65-4174-9C75-687C94E88273}"/>
               </a:ext>
               <a:ext uri="{C183D7F6-B498-43B3-948B-1728B52AA6E4}">
                 <adec:decorative xmlns:adec="http://schemas.microsoft.com/office/drawing/2017/decorative" val="1"/>
@@ -6081,23 +6147,20 @@
         </p:nvSpPr>
         <p:spPr>
           <a:xfrm>
-            <a:off x="477012" y="487090"/>
-            <a:ext cx="7324526" cy="5897880"/>
+            <a:off x="0" y="3383280"/>
+            <a:ext cx="6126480" cy="91440"/>
           </a:xfrm>
           <a:prstGeom prst="rect">
             <a:avLst/>
           </a:prstGeom>
           <a:solidFill>
-            <a:srgbClr val="FFFFFF"/>
+            <a:schemeClr val="tx1">
+              <a:lumMod val="75000"/>
+              <a:lumOff val="25000"/>
+            </a:schemeClr>
           </a:solidFill>
-          <a:ln w="19050">
-            <a:solidFill>
-              <a:schemeClr val="tx1">
-                <a:lumMod val="50000"/>
-                <a:lumOff val="50000"/>
-                <a:alpha val="80000"/>
-              </a:schemeClr>
-            </a:solidFill>
+          <a:ln>
+            <a:noFill/>
           </a:ln>
         </p:spPr>
         <p:style>
@@ -6125,48 +6188,12 @@
           </a:p>
         </p:txBody>
       </p:sp>
-      <p:pic>
-        <p:nvPicPr>
-          <p:cNvPr id="3" name="Picture 2" descr="A screenshot of a cell phone&#10;&#10;Description automatically generated">
-            <a:extLst>
-              <a:ext uri="{FF2B5EF4-FFF2-40B4-BE49-F238E27FC236}">
-                <a16:creationId xmlns:a16="http://schemas.microsoft.com/office/drawing/2014/main" id="{4E66AAD6-17C7-B04D-99FF-08D9BAB6828C}"/>
-              </a:ext>
-            </a:extLst>
-          </p:cNvPr>
-          <p:cNvPicPr>
-            <a:picLocks noChangeAspect="1"/>
-          </p:cNvPicPr>
-          <p:nvPr/>
-        </p:nvPicPr>
-        <p:blipFill>
-          <a:blip r:embed="rId2">
-            <a:extLst>
-              <a:ext uri="{28A0092B-C50C-407E-A947-70E740481C1C}">
-                <a14:useLocalDpi xmlns:a14="http://schemas.microsoft.com/office/drawing/2010/main" val="0"/>
-              </a:ext>
-            </a:extLst>
-          </a:blip>
-          <a:stretch>
-            <a:fillRect/>
-          </a:stretch>
-        </p:blipFill>
-        <p:spPr>
-          <a:xfrm>
-            <a:off x="834654" y="650497"/>
-            <a:ext cx="6612541" cy="5571066"/>
-          </a:xfrm>
-          <a:prstGeom prst="rect">
-            <a:avLst/>
-          </a:prstGeom>
-        </p:spPr>
-      </p:pic>
-      <p:sp>
-        <p:nvSpPr>
-          <p:cNvPr id="27" name="Rectangle 26">
-            <a:extLst>
-              <a:ext uri="{FF2B5EF4-FFF2-40B4-BE49-F238E27FC236}">
-                <a16:creationId xmlns:a16="http://schemas.microsoft.com/office/drawing/2014/main" id="{39F96DC1-4B54-4B36-B945-425E4C04AFBD}"/>
+      <p:sp>
+        <p:nvSpPr>
+          <p:cNvPr id="40" name="Rectangle 39">
+            <a:extLst>
+              <a:ext uri="{FF2B5EF4-FFF2-40B4-BE49-F238E27FC236}">
+                <a16:creationId xmlns:a16="http://schemas.microsoft.com/office/drawing/2014/main" id="{FA75DFED-A0C1-4A83-BE1D-0271C1826EF6}"/>
               </a:ext>
               <a:ext uri="{C183D7F6-B498-43B3-948B-1728B52AA6E4}">
                 <adec:decorative xmlns:adec="http://schemas.microsoft.com/office/drawing/2017/decorative" val="1"/>
@@ -6186,23 +6213,20 @@
         </p:nvSpPr>
         <p:spPr>
           <a:xfrm>
-            <a:off x="7969003" y="487090"/>
-            <a:ext cx="3745983" cy="1856232"/>
+            <a:off x="6065520" y="3383280"/>
+            <a:ext cx="6126480" cy="91440"/>
           </a:xfrm>
           <a:prstGeom prst="rect">
             <a:avLst/>
           </a:prstGeom>
           <a:solidFill>
-            <a:srgbClr val="FFFFFF"/>
+            <a:schemeClr val="tx1">
+              <a:lumMod val="75000"/>
+              <a:lumOff val="25000"/>
+            </a:schemeClr>
           </a:solidFill>
-          <a:ln w="19050">
-            <a:solidFill>
-              <a:schemeClr val="tx1">
-                <a:lumMod val="50000"/>
-                <a:lumOff val="50000"/>
-                <a:alpha val="80000"/>
-              </a:schemeClr>
-            </a:solidFill>
+          <a:ln>
+            <a:noFill/>
           </a:ln>
         </p:spPr>
         <p:style>
@@ -6232,115 +6256,10 @@
       </p:sp>
       <p:pic>
         <p:nvPicPr>
-          <p:cNvPr id="5" name="Picture 4">
-            <a:extLst>
-              <a:ext uri="{FF2B5EF4-FFF2-40B4-BE49-F238E27FC236}">
-                <a16:creationId xmlns:a16="http://schemas.microsoft.com/office/drawing/2014/main" id="{E777B17C-4814-6C44-A69B-26F11C612976}"/>
-              </a:ext>
-            </a:extLst>
-          </p:cNvPr>
-          <p:cNvPicPr>
-            <a:picLocks noChangeAspect="1"/>
-          </p:cNvPicPr>
-          <p:nvPr/>
-        </p:nvPicPr>
-        <p:blipFill>
-          <a:blip r:embed="rId3">
-            <a:extLst>
-              <a:ext uri="{28A0092B-C50C-407E-A947-70E740481C1C}">
-                <a14:useLocalDpi xmlns:a14="http://schemas.microsoft.com/office/drawing/2010/main" val="0"/>
-              </a:ext>
-            </a:extLst>
-          </a:blip>
-          <a:stretch>
-            <a:fillRect/>
-          </a:stretch>
-        </p:blipFill>
-        <p:spPr>
-          <a:xfrm>
-            <a:off x="8129872" y="719343"/>
-            <a:ext cx="3420946" cy="1380381"/>
-          </a:xfrm>
-          <a:prstGeom prst="rect">
-            <a:avLst/>
-          </a:prstGeom>
-        </p:spPr>
-      </p:pic>
-      <p:sp>
-        <p:nvSpPr>
-          <p:cNvPr id="29" name="Rectangle 28">
-            <a:extLst>
-              <a:ext uri="{FF2B5EF4-FFF2-40B4-BE49-F238E27FC236}">
-                <a16:creationId xmlns:a16="http://schemas.microsoft.com/office/drawing/2014/main" id="{A4F450A1-0760-4C39-82E4-515AA4FC9473}"/>
-              </a:ext>
-              <a:ext uri="{C183D7F6-B498-43B3-948B-1728B52AA6E4}">
-                <adec:decorative xmlns:adec="http://schemas.microsoft.com/office/drawing/2017/decorative" val="1"/>
-              </a:ext>
-            </a:extLst>
-          </p:cNvPr>
-          <p:cNvSpPr>
-            <a:spLocks noGrp="1" noRot="1" noChangeAspect="1" noMove="1" noResize="1" noEditPoints="1" noAdjustHandles="1" noChangeArrowheads="1" noChangeShapeType="1" noTextEdit="1"/>
-          </p:cNvSpPr>
-          <p:nvPr>
-            <p:extLst>
-              <p:ext uri="{386F3935-93C4-4BCD-93E2-E3B085C9AB24}">
-                <p16:designElem xmlns:p16="http://schemas.microsoft.com/office/powerpoint/2015/main" val="1"/>
-              </p:ext>
-            </p:extLst>
-          </p:nvPr>
-        </p:nvSpPr>
-        <p:spPr>
-          <a:xfrm>
-            <a:off x="7969003" y="2511639"/>
-            <a:ext cx="3745983" cy="1856232"/>
-          </a:xfrm>
-          <a:prstGeom prst="rect">
-            <a:avLst/>
-          </a:prstGeom>
-          <a:solidFill>
-            <a:srgbClr val="FFFFFF"/>
-          </a:solidFill>
-          <a:ln w="19050">
-            <a:solidFill>
-              <a:schemeClr val="tx1">
-                <a:lumMod val="50000"/>
-                <a:lumOff val="50000"/>
-                <a:alpha val="80000"/>
-              </a:schemeClr>
-            </a:solidFill>
-          </a:ln>
-        </p:spPr>
-        <p:style>
-          <a:lnRef idx="2">
-            <a:schemeClr val="accent1">
-              <a:shade val="50000"/>
-            </a:schemeClr>
-          </a:lnRef>
-          <a:fillRef idx="1">
-            <a:schemeClr val="accent1"/>
-          </a:fillRef>
-          <a:effectRef idx="0">
-            <a:schemeClr val="accent1"/>
-          </a:effectRef>
-          <a:fontRef idx="minor">
-            <a:schemeClr val="lt1"/>
-          </a:fontRef>
-        </p:style>
-        <p:txBody>
-          <a:bodyPr rtlCol="0" anchor="ctr"/>
-          <a:lstStyle/>
-          <a:p>
-            <a:pPr algn="ctr"/>
-            <a:endParaRPr lang="en-US"/>
-          </a:p>
-        </p:txBody>
-      </p:sp>
-      <p:pic>
-        <p:nvPicPr>
-          <p:cNvPr id="2" name="Picture 1">
-            <a:extLst>
-              <a:ext uri="{FF2B5EF4-FFF2-40B4-BE49-F238E27FC236}">
-                <a16:creationId xmlns:a16="http://schemas.microsoft.com/office/drawing/2014/main" id="{8B8675B4-8518-A34E-8339-92017719A907}"/>
+          <p:cNvPr id="7" name="Picture 6" descr="A screenshot of a cell phone&#10;&#10;Description automatically generated">
+            <a:extLst>
+              <a:ext uri="{FF2B5EF4-FFF2-40B4-BE49-F238E27FC236}">
+                <a16:creationId xmlns:a16="http://schemas.microsoft.com/office/drawing/2014/main" id="{5996B32F-EEEB-C646-BEFC-8489E3634DB6}"/>
               </a:ext>
             </a:extLst>
           </p:cNvPr>
@@ -6357,89 +6276,20 @@
         </p:blipFill>
         <p:spPr>
           <a:xfrm>
-            <a:off x="8129872" y="2814250"/>
-            <a:ext cx="3420946" cy="1248645"/>
+            <a:off x="457201" y="4068476"/>
+            <a:ext cx="5426764" cy="1885800"/>
           </a:xfrm>
           <a:prstGeom prst="rect">
             <a:avLst/>
           </a:prstGeom>
         </p:spPr>
       </p:pic>
-      <p:sp>
-        <p:nvSpPr>
-          <p:cNvPr id="31" name="Rectangle 30">
-            <a:extLst>
-              <a:ext uri="{FF2B5EF4-FFF2-40B4-BE49-F238E27FC236}">
-                <a16:creationId xmlns:a16="http://schemas.microsoft.com/office/drawing/2014/main" id="{0185CD32-2E94-4663-81AE-CC54E44AC2FC}"/>
-              </a:ext>
-              <a:ext uri="{C183D7F6-B498-43B3-948B-1728B52AA6E4}">
-                <adec:decorative xmlns:adec="http://schemas.microsoft.com/office/drawing/2017/decorative" val="1"/>
-              </a:ext>
-            </a:extLst>
-          </p:cNvPr>
-          <p:cNvSpPr>
-            <a:spLocks noGrp="1" noRot="1" noChangeAspect="1" noMove="1" noResize="1" noEditPoints="1" noAdjustHandles="1" noChangeArrowheads="1" noChangeShapeType="1" noTextEdit="1"/>
-          </p:cNvSpPr>
-          <p:nvPr>
-            <p:extLst>
-              <p:ext uri="{386F3935-93C4-4BCD-93E2-E3B085C9AB24}">
-                <p16:designElem xmlns:p16="http://schemas.microsoft.com/office/powerpoint/2015/main" val="1"/>
-              </p:ext>
-            </p:extLst>
-          </p:nvPr>
-        </p:nvSpPr>
-        <p:spPr>
-          <a:xfrm>
-            <a:off x="7969003" y="4528738"/>
-            <a:ext cx="3745983" cy="1856232"/>
-          </a:xfrm>
-          <a:prstGeom prst="rect">
-            <a:avLst/>
-          </a:prstGeom>
-          <a:solidFill>
-            <a:srgbClr val="FFFFFF"/>
-          </a:solidFill>
-          <a:ln w="19050">
-            <a:solidFill>
-              <a:schemeClr val="tx1">
-                <a:lumMod val="50000"/>
-                <a:lumOff val="50000"/>
-                <a:alpha val="80000"/>
-              </a:schemeClr>
-            </a:solidFill>
-          </a:ln>
-        </p:spPr>
-        <p:style>
-          <a:lnRef idx="2">
-            <a:schemeClr val="accent1">
-              <a:shade val="50000"/>
-            </a:schemeClr>
-          </a:lnRef>
-          <a:fillRef idx="1">
-            <a:schemeClr val="accent1"/>
-          </a:fillRef>
-          <a:effectRef idx="0">
-            <a:schemeClr val="accent1"/>
-          </a:effectRef>
-          <a:fontRef idx="minor">
-            <a:schemeClr val="lt1"/>
-          </a:fontRef>
-        </p:style>
-        <p:txBody>
-          <a:bodyPr rtlCol="0" anchor="ctr"/>
-          <a:lstStyle/>
-          <a:p>
-            <a:pPr algn="ctr"/>
-            <a:endParaRPr lang="en-US"/>
-          </a:p>
-        </p:txBody>
-      </p:sp>
       <p:pic>
         <p:nvPicPr>
-          <p:cNvPr id="7" name="Picture 6" descr="A screenshot of a cell phone&#10;&#10;Description automatically generated">
-            <a:extLst>
-              <a:ext uri="{FF2B5EF4-FFF2-40B4-BE49-F238E27FC236}">
-                <a16:creationId xmlns:a16="http://schemas.microsoft.com/office/drawing/2014/main" id="{5996B32F-EEEB-C646-BEFC-8489E3634DB6}"/>
+          <p:cNvPr id="5" name="Picture 4">
+            <a:extLst>
+              <a:ext uri="{FF2B5EF4-FFF2-40B4-BE49-F238E27FC236}">
+                <a16:creationId xmlns:a16="http://schemas.microsoft.com/office/drawing/2014/main" id="{E777B17C-4814-6C44-A69B-26F11C612976}"/>
               </a:ext>
             </a:extLst>
           </p:cNvPr>
@@ -6449,15 +6299,21 @@
           <p:nvPr/>
         </p:nvPicPr>
         <p:blipFill>
-          <a:blip r:embed="rId5"/>
+          <a:blip r:embed="rId5">
+            <a:extLst>
+              <a:ext uri="{28A0092B-C50C-407E-A947-70E740481C1C}">
+                <a14:useLocalDpi xmlns:a14="http://schemas.microsoft.com/office/drawing/2010/main" val="0"/>
+              </a:ext>
+            </a:extLst>
+          </a:blip>
           <a:stretch>
             <a:fillRect/>
           </a:stretch>
         </p:blipFill>
         <p:spPr>
           <a:xfrm>
-            <a:off x="8129872" y="4861107"/>
-            <a:ext cx="3420946" cy="1188778"/>
+            <a:off x="6308034" y="3979888"/>
+            <a:ext cx="5112595" cy="2062976"/>
           </a:xfrm>
           <a:prstGeom prst="rect">
             <a:avLst/>

</xml_diff>

<commit_message>
finished all except the final pca example
</commit_message>
<xml_diff>
--- a/materials/draft.pptx
+++ b/materials/draft.pptx
@@ -13,6 +13,7 @@
     <p:sldId id="265" r:id="rId7"/>
     <p:sldId id="267" r:id="rId8"/>
     <p:sldId id="268" r:id="rId9"/>
+    <p:sldId id="269" r:id="rId10"/>
   </p:sldIdLst>
   <p:sldSz cx="12192000" cy="6858000"/>
   <p:notesSz cx="6858000" cy="9144000"/>
@@ -266,7 +267,7 @@
           <a:p>
             <a:fld id="{CCF39288-C9BE-411C-8287-FC5D6539A5FE}" type="datetimeFigureOut">
               <a:rPr lang="en-US" smtClean="0"/>
-              <a:t>3/1/19</a:t>
+              <a:t>3/2/19</a:t>
             </a:fld>
             <a:endParaRPr lang="en-US"/>
           </a:p>
@@ -464,7 +465,7 @@
           <a:p>
             <a:fld id="{CCF39288-C9BE-411C-8287-FC5D6539A5FE}" type="datetimeFigureOut">
               <a:rPr lang="en-US" smtClean="0"/>
-              <a:t>3/1/19</a:t>
+              <a:t>3/2/19</a:t>
             </a:fld>
             <a:endParaRPr lang="en-US"/>
           </a:p>
@@ -672,7 +673,7 @@
           <a:p>
             <a:fld id="{CCF39288-C9BE-411C-8287-FC5D6539A5FE}" type="datetimeFigureOut">
               <a:rPr lang="en-US" smtClean="0"/>
-              <a:t>3/1/19</a:t>
+              <a:t>3/2/19</a:t>
             </a:fld>
             <a:endParaRPr lang="en-US"/>
           </a:p>
@@ -870,7 +871,7 @@
           <a:p>
             <a:fld id="{CCF39288-C9BE-411C-8287-FC5D6539A5FE}" type="datetimeFigureOut">
               <a:rPr lang="en-US" smtClean="0"/>
-              <a:t>3/1/19</a:t>
+              <a:t>3/2/19</a:t>
             </a:fld>
             <a:endParaRPr lang="en-US"/>
           </a:p>
@@ -1145,7 +1146,7 @@
           <a:p>
             <a:fld id="{CCF39288-C9BE-411C-8287-FC5D6539A5FE}" type="datetimeFigureOut">
               <a:rPr lang="en-US" smtClean="0"/>
-              <a:t>3/1/19</a:t>
+              <a:t>3/2/19</a:t>
             </a:fld>
             <a:endParaRPr lang="en-US"/>
           </a:p>
@@ -1410,7 +1411,7 @@
           <a:p>
             <a:fld id="{CCF39288-C9BE-411C-8287-FC5D6539A5FE}" type="datetimeFigureOut">
               <a:rPr lang="en-US" smtClean="0"/>
-              <a:t>3/1/19</a:t>
+              <a:t>3/2/19</a:t>
             </a:fld>
             <a:endParaRPr lang="en-US"/>
           </a:p>
@@ -1822,7 +1823,7 @@
           <a:p>
             <a:fld id="{CCF39288-C9BE-411C-8287-FC5D6539A5FE}" type="datetimeFigureOut">
               <a:rPr lang="en-US" smtClean="0"/>
-              <a:t>3/1/19</a:t>
+              <a:t>3/2/19</a:t>
             </a:fld>
             <a:endParaRPr lang="en-US"/>
           </a:p>
@@ -1963,7 +1964,7 @@
           <a:p>
             <a:fld id="{CCF39288-C9BE-411C-8287-FC5D6539A5FE}" type="datetimeFigureOut">
               <a:rPr lang="en-US" smtClean="0"/>
-              <a:t>3/1/19</a:t>
+              <a:t>3/2/19</a:t>
             </a:fld>
             <a:endParaRPr lang="en-US"/>
           </a:p>
@@ -2076,7 +2077,7 @@
           <a:p>
             <a:fld id="{CCF39288-C9BE-411C-8287-FC5D6539A5FE}" type="datetimeFigureOut">
               <a:rPr lang="en-US" smtClean="0"/>
-              <a:t>3/1/19</a:t>
+              <a:t>3/2/19</a:t>
             </a:fld>
             <a:endParaRPr lang="en-US"/>
           </a:p>
@@ -2387,7 +2388,7 @@
           <a:p>
             <a:fld id="{CCF39288-C9BE-411C-8287-FC5D6539A5FE}" type="datetimeFigureOut">
               <a:rPr lang="en-US" smtClean="0"/>
-              <a:t>3/1/19</a:t>
+              <a:t>3/2/19</a:t>
             </a:fld>
             <a:endParaRPr lang="en-US"/>
           </a:p>
@@ -2675,7 +2676,7 @@
           <a:p>
             <a:fld id="{CCF39288-C9BE-411C-8287-FC5D6539A5FE}" type="datetimeFigureOut">
               <a:rPr lang="en-US" smtClean="0"/>
-              <a:t>3/1/19</a:t>
+              <a:t>3/2/19</a:t>
             </a:fld>
             <a:endParaRPr lang="en-US"/>
           </a:p>
@@ -2916,7 +2917,7 @@
           <a:p>
             <a:fld id="{CCF39288-C9BE-411C-8287-FC5D6539A5FE}" type="datetimeFigureOut">
               <a:rPr lang="en-US" smtClean="0"/>
-              <a:t>3/1/19</a:t>
+              <a:t>3/2/19</a:t>
             </a:fld>
             <a:endParaRPr lang="en-US"/>
           </a:p>
@@ -7364,6 +7365,293 @@
 </p:sld>
 </file>
 
+<file path=ppt/slides/slide9.xml><?xml version="1.0" encoding="utf-8"?>
+<p:sld xmlns:a="http://schemas.openxmlformats.org/drawingml/2006/main" xmlns:r="http://schemas.openxmlformats.org/officeDocument/2006/relationships" xmlns:p="http://schemas.openxmlformats.org/presentationml/2006/main">
+  <p:cSld>
+    <p:bg>
+      <p:bgPr>
+        <a:solidFill>
+          <a:schemeClr val="bg1"/>
+        </a:solidFill>
+        <a:effectLst/>
+      </p:bgPr>
+    </p:bg>
+    <p:spTree>
+      <p:nvGrpSpPr>
+        <p:cNvPr id="1" name=""/>
+        <p:cNvGrpSpPr/>
+        <p:nvPr/>
+      </p:nvGrpSpPr>
+      <p:grpSpPr>
+        <a:xfrm>
+          <a:off x="0" y="0"/>
+          <a:ext cx="0" cy="0"/>
+          <a:chOff x="0" y="0"/>
+          <a:chExt cx="0" cy="0"/>
+        </a:xfrm>
+      </p:grpSpPr>
+      <p:sp>
+        <p:nvSpPr>
+          <p:cNvPr id="8" name="Rectangle 7">
+            <a:extLst>
+              <a:ext uri="{FF2B5EF4-FFF2-40B4-BE49-F238E27FC236}">
+                <a16:creationId xmlns:a16="http://schemas.microsoft.com/office/drawing/2014/main" id="{A9F529C3-C941-49FD-8C67-82F134F64BDB}"/>
+              </a:ext>
+              <a:ext uri="{C183D7F6-B498-43B3-948B-1728B52AA6E4}">
+                <adec:decorative xmlns:adec="http://schemas.microsoft.com/office/drawing/2017/decorative" val="1"/>
+              </a:ext>
+            </a:extLst>
+          </p:cNvPr>
+          <p:cNvSpPr>
+            <a:spLocks noGrp="1" noRot="1" noChangeAspect="1" noMove="1" noResize="1" noEditPoints="1" noAdjustHandles="1" noChangeArrowheads="1" noChangeShapeType="1" noTextEdit="1"/>
+          </p:cNvSpPr>
+          <p:nvPr>
+            <p:extLst>
+              <p:ext uri="{386F3935-93C4-4BCD-93E2-E3B085C9AB24}">
+                <p16:designElem xmlns:p16="http://schemas.microsoft.com/office/powerpoint/2015/main" val="1"/>
+              </p:ext>
+            </p:extLst>
+          </p:nvPr>
+        </p:nvSpPr>
+        <p:spPr>
+          <a:xfrm>
+            <a:off x="0" y="0"/>
+            <a:ext cx="12192000" cy="6858000"/>
+          </a:xfrm>
+          <a:prstGeom prst="rect">
+            <a:avLst/>
+          </a:prstGeom>
+          <a:solidFill>
+            <a:schemeClr val="tx1">
+              <a:lumMod val="50000"/>
+              <a:lumOff val="50000"/>
+              <a:alpha val="30000"/>
+            </a:schemeClr>
+          </a:solidFill>
+          <a:ln>
+            <a:noFill/>
+          </a:ln>
+        </p:spPr>
+        <p:style>
+          <a:lnRef idx="2">
+            <a:schemeClr val="accent1">
+              <a:shade val="50000"/>
+            </a:schemeClr>
+          </a:lnRef>
+          <a:fillRef idx="1">
+            <a:schemeClr val="accent1"/>
+          </a:fillRef>
+          <a:effectRef idx="0">
+            <a:schemeClr val="accent1"/>
+          </a:effectRef>
+          <a:fontRef idx="minor">
+            <a:schemeClr val="lt1"/>
+          </a:fontRef>
+        </p:style>
+        <p:txBody>
+          <a:bodyPr rtlCol="0" anchor="ctr"/>
+          <a:lstStyle/>
+          <a:p>
+            <a:pPr algn="ctr"/>
+            <a:endParaRPr lang="en-US"/>
+          </a:p>
+        </p:txBody>
+      </p:sp>
+      <p:sp>
+        <p:nvSpPr>
+          <p:cNvPr id="10" name="Rectangle 9">
+            <a:extLst>
+              <a:ext uri="{FF2B5EF4-FFF2-40B4-BE49-F238E27FC236}">
+                <a16:creationId xmlns:a16="http://schemas.microsoft.com/office/drawing/2014/main" id="{20586029-32A0-47E5-9AEC-AE3ABA6B94D0}"/>
+              </a:ext>
+              <a:ext uri="{C183D7F6-B498-43B3-948B-1728B52AA6E4}">
+                <adec:decorative xmlns:adec="http://schemas.microsoft.com/office/drawing/2017/decorative" val="1"/>
+              </a:ext>
+            </a:extLst>
+          </p:cNvPr>
+          <p:cNvSpPr>
+            <a:spLocks noGrp="1" noRot="1" noChangeAspect="1" noMove="1" noResize="1" noEditPoints="1" noAdjustHandles="1" noChangeArrowheads="1" noChangeShapeType="1" noTextEdit="1"/>
+          </p:cNvSpPr>
+          <p:nvPr>
+            <p:extLst>
+              <p:ext uri="{386F3935-93C4-4BCD-93E2-E3B085C9AB24}">
+                <p16:designElem xmlns:p16="http://schemas.microsoft.com/office/powerpoint/2015/main" val="1"/>
+              </p:ext>
+            </p:extLst>
+          </p:nvPr>
+        </p:nvSpPr>
+        <p:spPr>
+          <a:xfrm>
+            <a:off x="477012" y="480060"/>
+            <a:ext cx="11237976" cy="5897880"/>
+          </a:xfrm>
+          <a:prstGeom prst="rect">
+            <a:avLst/>
+          </a:prstGeom>
+          <a:solidFill>
+            <a:srgbClr val="FFFFFF"/>
+          </a:solidFill>
+          <a:ln w="9525">
+            <a:noFill/>
+          </a:ln>
+          <a:effectLst>
+            <a:outerShdw blurRad="63500" dist="17780" dir="5400000" algn="t" rotWithShape="0">
+              <a:prstClr val="black">
+                <a:alpha val="43000"/>
+              </a:prstClr>
+            </a:outerShdw>
+          </a:effectLst>
+        </p:spPr>
+        <p:style>
+          <a:lnRef idx="2">
+            <a:schemeClr val="accent1">
+              <a:shade val="50000"/>
+            </a:schemeClr>
+          </a:lnRef>
+          <a:fillRef idx="1">
+            <a:schemeClr val="accent1"/>
+          </a:fillRef>
+          <a:effectRef idx="0">
+            <a:schemeClr val="accent1"/>
+          </a:effectRef>
+          <a:fontRef idx="minor">
+            <a:schemeClr val="lt1"/>
+          </a:fontRef>
+        </p:style>
+        <p:txBody>
+          <a:bodyPr rtlCol="0" anchor="ctr"/>
+          <a:lstStyle/>
+          <a:p>
+            <a:pPr algn="ctr"/>
+            <a:endParaRPr lang="en-US"/>
+          </a:p>
+        </p:txBody>
+      </p:sp>
+      <p:pic>
+        <p:nvPicPr>
+          <p:cNvPr id="2" name="Picture 1">
+            <a:extLst>
+              <a:ext uri="{FF2B5EF4-FFF2-40B4-BE49-F238E27FC236}">
+                <a16:creationId xmlns:a16="http://schemas.microsoft.com/office/drawing/2014/main" id="{3F7C914F-894F-4244-8C7A-9A0CE923864B}"/>
+              </a:ext>
+            </a:extLst>
+          </p:cNvPr>
+          <p:cNvPicPr>
+            <a:picLocks noChangeAspect="1"/>
+          </p:cNvPicPr>
+          <p:nvPr/>
+        </p:nvPicPr>
+        <p:blipFill>
+          <a:blip r:embed="rId2"/>
+          <a:stretch>
+            <a:fillRect/>
+          </a:stretch>
+        </p:blipFill>
+        <p:spPr>
+          <a:xfrm>
+            <a:off x="643467" y="1066232"/>
+            <a:ext cx="5294716" cy="4725533"/>
+          </a:xfrm>
+          <a:prstGeom prst="rect">
+            <a:avLst/>
+          </a:prstGeom>
+        </p:spPr>
+      </p:pic>
+      <p:cxnSp>
+        <p:nvCxnSpPr>
+          <p:cNvPr id="12" name="Straight Connector 11">
+            <a:extLst>
+              <a:ext uri="{FF2B5EF4-FFF2-40B4-BE49-F238E27FC236}">
+                <a16:creationId xmlns:a16="http://schemas.microsoft.com/office/drawing/2014/main" id="{8C730EAB-A532-4295-A302-FB4B90DB9F5E}"/>
+              </a:ext>
+              <a:ext uri="{C183D7F6-B498-43B3-948B-1728B52AA6E4}">
+                <adec:decorative xmlns:adec="http://schemas.microsoft.com/office/drawing/2017/decorative" val="1"/>
+              </a:ext>
+            </a:extLst>
+          </p:cNvPr>
+          <p:cNvCxnSpPr>
+            <a:cxnSpLocks noGrp="1" noRot="1" noChangeAspect="1" noMove="1" noResize="1" noEditPoints="1" noAdjustHandles="1" noChangeArrowheads="1" noChangeShapeType="1"/>
+          </p:cNvCxnSpPr>
+          <p:nvPr>
+            <p:extLst>
+              <p:ext uri="{386F3935-93C4-4BCD-93E2-E3B085C9AB24}">
+                <p16:designElem xmlns:p16="http://schemas.microsoft.com/office/powerpoint/2015/main" val="1"/>
+              </p:ext>
+            </p:extLst>
+          </p:nvPr>
+        </p:nvCxnSpPr>
+        <p:spPr>
+          <a:xfrm>
+            <a:off x="6079958" y="1143000"/>
+            <a:ext cx="0" cy="4572000"/>
+          </a:xfrm>
+          <a:prstGeom prst="line">
+            <a:avLst/>
+          </a:prstGeom>
+          <a:ln>
+            <a:solidFill>
+              <a:srgbClr val="4E4E4E"/>
+            </a:solidFill>
+          </a:ln>
+        </p:spPr>
+        <p:style>
+          <a:lnRef idx="1">
+            <a:schemeClr val="accent1"/>
+          </a:lnRef>
+          <a:fillRef idx="0">
+            <a:schemeClr val="accent1"/>
+          </a:fillRef>
+          <a:effectRef idx="0">
+            <a:schemeClr val="accent1"/>
+          </a:effectRef>
+          <a:fontRef idx="minor">
+            <a:schemeClr val="tx1"/>
+          </a:fontRef>
+        </p:style>
+      </p:cxnSp>
+      <p:pic>
+        <p:nvPicPr>
+          <p:cNvPr id="3" name="Picture 2">
+            <a:extLst>
+              <a:ext uri="{FF2B5EF4-FFF2-40B4-BE49-F238E27FC236}">
+                <a16:creationId xmlns:a16="http://schemas.microsoft.com/office/drawing/2014/main" id="{168311F4-684B-3449-B037-6F42AA9848EA}"/>
+              </a:ext>
+            </a:extLst>
+          </p:cNvPr>
+          <p:cNvPicPr>
+            <a:picLocks noChangeAspect="1"/>
+          </p:cNvPicPr>
+          <p:nvPr/>
+        </p:nvPicPr>
+        <p:blipFill>
+          <a:blip r:embed="rId3"/>
+          <a:stretch>
+            <a:fillRect/>
+          </a:stretch>
+        </p:blipFill>
+        <p:spPr>
+          <a:xfrm>
+            <a:off x="6253817" y="1066234"/>
+            <a:ext cx="5294715" cy="4725532"/>
+          </a:xfrm>
+          <a:prstGeom prst="rect">
+            <a:avLst/>
+          </a:prstGeom>
+        </p:spPr>
+      </p:pic>
+    </p:spTree>
+    <p:extLst>
+      <p:ext uri="{BB962C8B-B14F-4D97-AF65-F5344CB8AC3E}">
+        <p14:creationId xmlns:p14="http://schemas.microsoft.com/office/powerpoint/2010/main" val="2428246178"/>
+      </p:ext>
+    </p:extLst>
+  </p:cSld>
+  <p:clrMapOvr>
+    <a:masterClrMapping/>
+  </p:clrMapOvr>
+</p:sld>
+</file>
+
 <file path=ppt/theme/theme1.xml><?xml version="1.0" encoding="utf-8"?>
 <a:theme xmlns:a="http://schemas.openxmlformats.org/drawingml/2006/main" name="Office Theme">
   <a:themeElements>

</xml_diff>

<commit_message>
more tweak after presentation
</commit_message>
<xml_diff>
--- a/materials/draft.pptx
+++ b/materials/draft.pptx
@@ -14,6 +14,7 @@
     <p:sldId id="267" r:id="rId8"/>
     <p:sldId id="268" r:id="rId9"/>
     <p:sldId id="269" r:id="rId10"/>
+    <p:sldId id="270" r:id="rId11"/>
   </p:sldIdLst>
   <p:sldSz cx="12192000" cy="6858000"/>
   <p:notesSz cx="6858000" cy="9144000"/>
@@ -3735,6 +3736,71 @@
     <p:extLst>
       <p:ext uri="{BB962C8B-B14F-4D97-AF65-F5344CB8AC3E}">
         <p14:creationId xmlns:p14="http://schemas.microsoft.com/office/powerpoint/2010/main" val="1839643824"/>
+      </p:ext>
+    </p:extLst>
+  </p:cSld>
+  <p:clrMapOvr>
+    <a:masterClrMapping/>
+  </p:clrMapOvr>
+</p:sld>
+</file>
+
+<file path=ppt/slides/slide10.xml><?xml version="1.0" encoding="utf-8"?>
+<p:sld xmlns:a="http://schemas.openxmlformats.org/drawingml/2006/main" xmlns:r="http://schemas.openxmlformats.org/officeDocument/2006/relationships" xmlns:p="http://schemas.openxmlformats.org/presentationml/2006/main">
+  <p:cSld>
+    <p:spTree>
+      <p:nvGrpSpPr>
+        <p:cNvPr id="1" name=""/>
+        <p:cNvGrpSpPr/>
+        <p:nvPr/>
+      </p:nvGrpSpPr>
+      <p:grpSpPr>
+        <a:xfrm>
+          <a:off x="0" y="0"/>
+          <a:ext cx="0" cy="0"/>
+          <a:chOff x="0" y="0"/>
+          <a:chExt cx="0" cy="0"/>
+        </a:xfrm>
+      </p:grpSpPr>
+      <p:sp>
+        <p:nvSpPr>
+          <p:cNvPr id="2" name="TextBox 1">
+            <a:extLst>
+              <a:ext uri="{FF2B5EF4-FFF2-40B4-BE49-F238E27FC236}">
+                <a16:creationId xmlns:a16="http://schemas.microsoft.com/office/drawing/2014/main" id="{C63D4B03-0C38-1947-B151-5233ACAB993E}"/>
+              </a:ext>
+            </a:extLst>
+          </p:cNvPr>
+          <p:cNvSpPr txBox="1"/>
+          <p:nvPr/>
+        </p:nvSpPr>
+        <p:spPr>
+          <a:xfrm>
+            <a:off x="9164055" y="149088"/>
+            <a:ext cx="3027945" cy="369332"/>
+          </a:xfrm>
+          <a:prstGeom prst="rect">
+            <a:avLst/>
+          </a:prstGeom>
+          <a:noFill/>
+        </p:spPr>
+        <p:txBody>
+          <a:bodyPr wrap="none" rtlCol="0">
+            <a:spAutoFit/>
+          </a:bodyPr>
+          <a:lstStyle/>
+          <a:p>
+            <a:r>
+              <a:rPr lang="en-US" dirty="0"/>
+              <a:t>Copyright © 2019 Xiangshi Yin</a:t>
+            </a:r>
+          </a:p>
+        </p:txBody>
+      </p:sp>
+    </p:spTree>
+    <p:extLst>
+      <p:ext uri="{BB962C8B-B14F-4D97-AF65-F5344CB8AC3E}">
+        <p14:creationId xmlns:p14="http://schemas.microsoft.com/office/powerpoint/2010/main" val="3304923125"/>
       </p:ext>
     </p:extLst>
   </p:cSld>
@@ -7529,7 +7595,7 @@
       </p:sp>
       <p:pic>
         <p:nvPicPr>
-          <p:cNvPr id="2" name="Picture 1">
+          <p:cNvPr id="2" name="Picture 1" descr="A screenshot of a cell phone&#10;&#10;Description automatically generated">
             <a:extLst>
               <a:ext uri="{FF2B5EF4-FFF2-40B4-BE49-F238E27FC236}">
                 <a16:creationId xmlns:a16="http://schemas.microsoft.com/office/drawing/2014/main" id="{3F7C914F-894F-4244-8C7A-9A0CE923864B}"/>
@@ -7611,7 +7677,7 @@
       </p:cxnSp>
       <p:pic>
         <p:nvPicPr>
-          <p:cNvPr id="3" name="Picture 2">
+          <p:cNvPr id="3" name="Picture 2" descr="A purple flower in a field&#10;&#10;Description automatically generated">
             <a:extLst>
               <a:ext uri="{FF2B5EF4-FFF2-40B4-BE49-F238E27FC236}">
                 <a16:creationId xmlns:a16="http://schemas.microsoft.com/office/drawing/2014/main" id="{168311F4-684B-3449-B037-6F42AA9848EA}"/>

</xml_diff>